<commit_message>
used matlab point data
</commit_message>
<xml_diff>
--- a/public/js/tasks/horizon/media/horizonInstructions.pptx
+++ b/public/js/tasks/horizon/media/horizonInstructions.pptx
@@ -229,7 +229,7 @@
           <a:p>
             <a:fld id="{5ACDFB13-8C7E-2148-B293-047F9641DD71}" type="datetimeFigureOut">
               <a:rPr lang="en-US" smtClean="0"/>
-              <a:t>7/20/20</a:t>
+              <a:t>7/27/20</a:t>
             </a:fld>
             <a:endParaRPr lang="en-US" dirty="0"/>
           </a:p>
@@ -2809,7 +2809,7 @@
           <a:p>
             <a:fld id="{E69A4D3A-6EF8-7448-AC6F-AD52FEDAA6A8}" type="datetimeFigureOut">
               <a:rPr lang="en-US" smtClean="0"/>
-              <a:t>7/20/20</a:t>
+              <a:t>7/27/20</a:t>
             </a:fld>
             <a:endParaRPr lang="en-US" dirty="0"/>
           </a:p>
@@ -2977,7 +2977,7 @@
           <a:p>
             <a:fld id="{E69A4D3A-6EF8-7448-AC6F-AD52FEDAA6A8}" type="datetimeFigureOut">
               <a:rPr lang="en-US" smtClean="0"/>
-              <a:t>7/20/20</a:t>
+              <a:t>7/27/20</a:t>
             </a:fld>
             <a:endParaRPr lang="en-US" dirty="0"/>
           </a:p>
@@ -3155,7 +3155,7 @@
           <a:p>
             <a:fld id="{E69A4D3A-6EF8-7448-AC6F-AD52FEDAA6A8}" type="datetimeFigureOut">
               <a:rPr lang="en-US" smtClean="0"/>
-              <a:t>7/20/20</a:t>
+              <a:t>7/27/20</a:t>
             </a:fld>
             <a:endParaRPr lang="en-US" dirty="0"/>
           </a:p>
@@ -3323,7 +3323,7 @@
           <a:p>
             <a:fld id="{E69A4D3A-6EF8-7448-AC6F-AD52FEDAA6A8}" type="datetimeFigureOut">
               <a:rPr lang="en-US" smtClean="0"/>
-              <a:t>7/20/20</a:t>
+              <a:t>7/27/20</a:t>
             </a:fld>
             <a:endParaRPr lang="en-US" dirty="0"/>
           </a:p>
@@ -3568,7 +3568,7 @@
           <a:p>
             <a:fld id="{E69A4D3A-6EF8-7448-AC6F-AD52FEDAA6A8}" type="datetimeFigureOut">
               <a:rPr lang="en-US" smtClean="0"/>
-              <a:t>7/20/20</a:t>
+              <a:t>7/27/20</a:t>
             </a:fld>
             <a:endParaRPr lang="en-US" dirty="0"/>
           </a:p>
@@ -3853,7 +3853,7 @@
           <a:p>
             <a:fld id="{E69A4D3A-6EF8-7448-AC6F-AD52FEDAA6A8}" type="datetimeFigureOut">
               <a:rPr lang="en-US" smtClean="0"/>
-              <a:t>7/20/20</a:t>
+              <a:t>7/27/20</a:t>
             </a:fld>
             <a:endParaRPr lang="en-US" dirty="0"/>
           </a:p>
@@ -4272,7 +4272,7 @@
           <a:p>
             <a:fld id="{E69A4D3A-6EF8-7448-AC6F-AD52FEDAA6A8}" type="datetimeFigureOut">
               <a:rPr lang="en-US" smtClean="0"/>
-              <a:t>7/20/20</a:t>
+              <a:t>7/27/20</a:t>
             </a:fld>
             <a:endParaRPr lang="en-US" dirty="0"/>
           </a:p>
@@ -4389,7 +4389,7 @@
           <a:p>
             <a:fld id="{E69A4D3A-6EF8-7448-AC6F-AD52FEDAA6A8}" type="datetimeFigureOut">
               <a:rPr lang="en-US" smtClean="0"/>
-              <a:t>7/20/20</a:t>
+              <a:t>7/27/20</a:t>
             </a:fld>
             <a:endParaRPr lang="en-US" dirty="0"/>
           </a:p>
@@ -4484,7 +4484,7 @@
           <a:p>
             <a:fld id="{E69A4D3A-6EF8-7448-AC6F-AD52FEDAA6A8}" type="datetimeFigureOut">
               <a:rPr lang="en-US" smtClean="0"/>
-              <a:t>7/20/20</a:t>
+              <a:t>7/27/20</a:t>
             </a:fld>
             <a:endParaRPr lang="en-US" dirty="0"/>
           </a:p>
@@ -4759,7 +4759,7 @@
           <a:p>
             <a:fld id="{E69A4D3A-6EF8-7448-AC6F-AD52FEDAA6A8}" type="datetimeFigureOut">
               <a:rPr lang="en-US" smtClean="0"/>
-              <a:t>7/20/20</a:t>
+              <a:t>7/27/20</a:t>
             </a:fld>
             <a:endParaRPr lang="en-US" dirty="0"/>
           </a:p>
@@ -5014,7 +5014,7 @@
           <a:p>
             <a:fld id="{E69A4D3A-6EF8-7448-AC6F-AD52FEDAA6A8}" type="datetimeFigureOut">
               <a:rPr lang="en-US" smtClean="0"/>
-              <a:t>7/20/20</a:t>
+              <a:t>7/27/20</a:t>
             </a:fld>
             <a:endParaRPr lang="en-US" dirty="0"/>
           </a:p>
@@ -5228,7 +5228,7 @@
           <a:p>
             <a:fld id="{E69A4D3A-6EF8-7448-AC6F-AD52FEDAA6A8}" type="datetimeFigureOut">
               <a:rPr lang="en-US" smtClean="0"/>
-              <a:t>7/20/20</a:t>
+              <a:t>7/27/20</a:t>
             </a:fld>
             <a:endParaRPr lang="en-US" dirty="0"/>
           </a:p>
@@ -6701,7 +6701,7 @@
             </a:pPr>
             <a:r>
               <a:rPr lang="en-US" dirty="0"/>
-              <a:t>And so on, such that if we were to play the right bandit 5 times in a row we might see these rewards.</a:t>
+              <a:t>And so on, such that if we were to play the right slot machine 5 times in a row we might see these rewards.</a:t>
             </a:r>
           </a:p>
         </p:txBody>
@@ -7457,7 +7457,7 @@
             </a:pPr>
             <a:r>
               <a:rPr lang="en-US" dirty="0"/>
-              <a:t>Both bandits will have the same kind of variability, and this variability will stay constant throughout the experiment.</a:t>
+              <a:t>Both slot machines will have the same kind of variability, and this variability will stay constant throughout the experiment.</a:t>
             </a:r>
           </a:p>
         </p:txBody>
@@ -8172,7 +8172,7 @@
             </a:pPr>
             <a:r>
               <a:rPr lang="en-US" dirty="0"/>
-              <a:t>During each game, one of the bandits will always have a higher average reward and hence is the better option to choose on average. However, the same bandit will not always be best for all games.</a:t>
+              <a:t>During each game, one of the slot machines will always have a higher average reward and hence is the better option to choose on average. However, the same slot machine will not always be best for all games.</a:t>
             </a:r>
           </a:p>
         </p:txBody>
@@ -8896,7 +8896,7 @@
             </a:pPr>
             <a:r>
               <a:rPr lang="en-US" dirty="0"/>
-              <a:t>Press the LEFT BUTTON to play the left bandit.</a:t>
+              <a:t>Press the LEFT BUTTON to play the left slot machine.</a:t>
             </a:r>
           </a:p>
           <a:p>
@@ -8905,7 +8905,7 @@
             </a:pPr>
             <a:r>
               <a:rPr lang="en-US" dirty="0"/>
-              <a:t>Press the RIGHT BUTTON to play the right bandit.</a:t>
+              <a:t>Press the RIGHT BUTTON to play the right slot machine.</a:t>
             </a:r>
           </a:p>
         </p:txBody>
@@ -9369,7 +9369,7 @@
             </a:pPr>
             <a:r>
               <a:rPr lang="en-US" dirty="0"/>
-              <a:t>On any trial you can only play one bandit and the number of trials in each game is determined by the height of the bandits. For example, when the bandits are 10 boxes high, there are 10 trials in each game.</a:t>
+              <a:t>On any trial you can only play one slot machine and the number of trials in each game is determined by the height of the slot machine. For example, when the slot machines are 10 boxes high, there are 10 trials in each game.</a:t>
             </a:r>
           </a:p>
         </p:txBody>
@@ -10239,7 +10239,7 @@
             </a:pPr>
             <a:r>
               <a:rPr lang="en-US" dirty="0"/>
-              <a:t>In addition, the first 4 choices in each game are instructed trials where we will choose an option for you. This will give you some experience with each option before you make your first choice between the two bandits.</a:t>
+              <a:t>In addition, the first 4 choices in each game are instructed trials where we will choose an option for you. This will give you some experience with each option before you make your first choice between the two slot machines.</a:t>
             </a:r>
           </a:p>
         </p:txBody>
@@ -10778,7 +10778,7 @@
             </a:pPr>
             <a:r>
               <a:rPr lang="en-US" dirty="0"/>
-              <a:t>These instructed trials will be indicated by a green square inside the box we want you to open. You must press the button to choose this option in order to see the reward and move on to the next trial. </a:t>
+              <a:t>These instructed trials will be indicated by a red square inside the box we want you to open. You must press the button to choose this option in order to see the reward and move on to the next trial. </a:t>
             </a:r>
           </a:p>
           <a:p>
@@ -11152,7 +11152,7 @@
             <a:avLst/>
           </a:prstGeom>
           <a:solidFill>
-            <a:srgbClr val="00B050"/>
+            <a:srgbClr val="FF0000"/>
           </a:solidFill>
           <a:ln>
             <a:noFill/>
@@ -11639,7 +11639,7 @@
             <a:avLst/>
           </a:prstGeom>
           <a:solidFill>
-            <a:srgbClr val="00B050"/>
+            <a:srgbClr val="FF0000"/>
           </a:solidFill>
           <a:ln>
             <a:noFill/>
@@ -11899,7 +11899,7 @@
             </a:pPr>
             <a:r>
               <a:rPr lang="en-US" dirty="0"/>
-              <a:t>In this experiment, we would like you to choose between 2 one-armed bandits of the sort you might find in a casino.</a:t>
+              <a:t>In this experiment, we would like you to choose between 2 slot machines of the sort you might find in a casino.</a:t>
             </a:r>
           </a:p>
           <a:p>
@@ -13111,7 +13111,7 @@
             </a:pPr>
             <a:r>
               <a:rPr lang="en-US" dirty="0"/>
-              <a:t>Press the LEFT BUTTON to play the left bandit.</a:t>
+              <a:t>Press the LEFT BUTTON to play the left slot machine.</a:t>
             </a:r>
           </a:p>
           <a:p>
@@ -13120,7 +13120,7 @@
             </a:pPr>
             <a:r>
               <a:rPr lang="en-US" dirty="0"/>
-              <a:t>Press the RIGHT BUTTON to play the right bandit.</a:t>
+              <a:t>Press the RIGHT BUTTON to play the right machine.</a:t>
             </a:r>
           </a:p>
         </p:txBody>
@@ -13658,7 +13658,7 @@
             </a:pPr>
             <a:r>
               <a:rPr lang="en-US" dirty="0"/>
-              <a:t>The one-armed bandits will be represented like this:</a:t>
+              <a:t>The slot machines bandits will be represented like this:</a:t>
             </a:r>
           </a:p>
         </p:txBody>
@@ -14093,7 +14093,7 @@
             </a:pPr>
             <a:r>
               <a:rPr lang="en-US" dirty="0"/>
-              <a:t>Every time you choose to play a particular bandit, the lever will be pulled down. For example, if  you chose the left bandit, it would look like this:</a:t>
+              <a:t>Every time you choose to play a particular slot machine, the lever will be pulled down. For example, if  you chose the left slot machine, it would look like this:</a:t>
             </a:r>
           </a:p>
         </p:txBody>
@@ -14557,7 +14557,7 @@
             </a:pPr>
             <a:r>
               <a:rPr lang="en-US" sz="2800" dirty="0"/>
-              <a:t>The points you win will be shown like this. For example, in this case the left bandit was chosen and gave 77 points. XXs will be shown for the bandit that wasn’t chosen. So you will not know how many points you would have won if you chose the other bandit instead.</a:t>
+              <a:t>The points you win will be shown like this. For example, in this case the left slot machine was chosen and gave 77 points. XXs will be shown for the bandit that wasn’t chosen. So you will not know how many points you would have won if you chose the other slot machine instead.</a:t>
             </a:r>
           </a:p>
         </p:txBody>
@@ -15567,7 +15567,7 @@
             </a:pPr>
             <a:r>
               <a:rPr lang="en-US" dirty="0"/>
-              <a:t>During one game, a bandit will tend to pay out about the same amount on average, but there is variability in the reward on any given choice. </a:t>
+              <a:t>During one game, a slot machine will tend to pay out about the same amount on average, but there is variability in the reward on any given choice. </a:t>
             </a:r>
           </a:p>
         </p:txBody>
@@ -16002,7 +16002,7 @@
             </a:pPr>
             <a:r>
               <a:rPr lang="en-US" dirty="0"/>
-              <a:t>For example, the average reward for the bandit on the right might be 50 points, but on the first play we might see a reward of 52 points because of the variability.</a:t>
+              <a:t>For example, the average reward for the slot machine on the right might be 50 points, but on the first play we might see a reward of 52 points because of the variability.</a:t>
             </a:r>
           </a:p>
         </p:txBody>

</xml_diff>